<commit_message>
replace ex3 for the third class
</commit_message>
<xml_diff>
--- a/course/stage3-3.pptx
+++ b/course/stage3-3.pptx
@@ -246,7 +246,7 @@
           <a:p>
             <a:fld id="{0232C0B5-5BBF-4687-A2C4-7EEAA89D523D}" type="datetimeFigureOut">
               <a:rPr lang="zh-CN" altLang="en-US" smtClean="0"/>
-              <a:t>2024/11/15</a:t>
+              <a:t>2024/12/19</a:t>
             </a:fld>
             <a:endParaRPr lang="zh-CN" altLang="en-US"/>
           </a:p>
@@ -1068,7 +1068,7 @@
           <a:p>
             <a:fld id="{EB623CAD-3B9E-46A0-9FDD-A80C10F87FB0}" type="datetime1">
               <a:rPr lang="zh-CN" altLang="en-US" smtClean="0"/>
-              <a:t>2024/11/15</a:t>
+              <a:t>2024/12/19</a:t>
             </a:fld>
             <a:endParaRPr lang="zh-CN" altLang="en-US"/>
           </a:p>
@@ -1287,7 +1287,7 @@
           <a:p>
             <a:fld id="{EA2C4650-8E13-4B0E-B8C1-F57D7E0EB596}" type="datetime1">
               <a:rPr lang="zh-CN" altLang="en-US" smtClean="0"/>
-              <a:t>2024/11/15</a:t>
+              <a:t>2024/12/19</a:t>
             </a:fld>
             <a:endParaRPr lang="zh-CN" altLang="en-US"/>
           </a:p>
@@ -1495,7 +1495,7 @@
           <a:p>
             <a:fld id="{55D7C513-3B6B-4E0D-AF29-482BEE40A6F8}" type="datetime1">
               <a:rPr lang="zh-CN" altLang="en-US" smtClean="0"/>
-              <a:t>2024/11/15</a:t>
+              <a:t>2024/12/19</a:t>
             </a:fld>
             <a:endParaRPr lang="zh-CN" altLang="en-US"/>
           </a:p>
@@ -1693,7 +1693,7 @@
           <a:p>
             <a:fld id="{5C12CAC3-CE72-4BEA-BF09-E77424D85D87}" type="datetime1">
               <a:rPr lang="zh-CN" altLang="en-US" smtClean="0"/>
-              <a:t>2024/11/15</a:t>
+              <a:t>2024/12/19</a:t>
             </a:fld>
             <a:endParaRPr lang="zh-CN" altLang="en-US"/>
           </a:p>
@@ -1989,7 +1989,7 @@
           <a:p>
             <a:fld id="{E82FC16E-3383-4F04-BD0D-053F7A78B5A6}" type="datetime1">
               <a:rPr lang="zh-CN" altLang="en-US" smtClean="0"/>
-              <a:t>2024/11/15</a:t>
+              <a:t>2024/12/19</a:t>
             </a:fld>
             <a:endParaRPr lang="zh-CN" altLang="en-US"/>
           </a:p>
@@ -2270,7 +2270,7 @@
           <a:p>
             <a:fld id="{8401C318-F029-4FDA-8C56-1F1D338AC7C4}" type="datetime1">
               <a:rPr lang="zh-CN" altLang="en-US" smtClean="0"/>
-              <a:t>2024/11/15</a:t>
+              <a:t>2024/12/19</a:t>
             </a:fld>
             <a:endParaRPr lang="zh-CN" altLang="en-US"/>
           </a:p>
@@ -2682,7 +2682,7 @@
           <a:p>
             <a:fld id="{29B0125D-7816-4C91-BBA2-76782B34C4F6}" type="datetime1">
               <a:rPr lang="zh-CN" altLang="en-US" smtClean="0"/>
-              <a:t>2024/11/15</a:t>
+              <a:t>2024/12/19</a:t>
             </a:fld>
             <a:endParaRPr lang="zh-CN" altLang="en-US"/>
           </a:p>
@@ -2823,7 +2823,7 @@
           <a:p>
             <a:fld id="{92F32449-5E2A-4397-96D3-6D0590BBA559}" type="datetime1">
               <a:rPr lang="zh-CN" altLang="en-US" smtClean="0"/>
-              <a:t>2024/11/15</a:t>
+              <a:t>2024/12/19</a:t>
             </a:fld>
             <a:endParaRPr lang="zh-CN" altLang="en-US"/>
           </a:p>
@@ -2936,7 +2936,7 @@
           <a:p>
             <a:fld id="{440E03A7-202F-499C-A3C2-A80E898FE44A}" type="datetime1">
               <a:rPr lang="zh-CN" altLang="en-US" smtClean="0"/>
-              <a:t>2024/11/15</a:t>
+              <a:t>2024/12/19</a:t>
             </a:fld>
             <a:endParaRPr lang="zh-CN" altLang="en-US"/>
           </a:p>
@@ -3247,7 +3247,7 @@
           <a:p>
             <a:fld id="{C0D26C8A-C4FB-4CA8-B76D-BD83A6B56D40}" type="datetime1">
               <a:rPr lang="zh-CN" altLang="en-US" smtClean="0"/>
-              <a:t>2024/11/15</a:t>
+              <a:t>2024/12/19</a:t>
             </a:fld>
             <a:endParaRPr lang="zh-CN" altLang="en-US"/>
           </a:p>
@@ -3535,7 +3535,7 @@
           <a:p>
             <a:fld id="{BCB81798-0E96-410A-869C-0D47CD904D4E}" type="datetime1">
               <a:rPr lang="zh-CN" altLang="en-US" smtClean="0"/>
-              <a:t>2024/11/15</a:t>
+              <a:t>2024/12/19</a:t>
             </a:fld>
             <a:endParaRPr lang="zh-CN" altLang="en-US"/>
           </a:p>
@@ -3776,7 +3776,7 @@
           <a:p>
             <a:fld id="{49B5EE7A-93C4-4B25-B462-6ADE7E90FB1D}" type="datetime1">
               <a:rPr lang="zh-CN" altLang="en-US" smtClean="0"/>
-              <a:t>2024/11/15</a:t>
+              <a:t>2024/12/19</a:t>
             </a:fld>
             <a:endParaRPr lang="zh-CN" altLang="en-US"/>
           </a:p>
@@ -26020,11 +26020,19 @@
             </a:r>
             <a:r>
               <a:rPr lang="en-US" altLang="zh-CN" sz="3200"/>
-              <a:t>shell</a:t>
+              <a:t>RamFS</a:t>
             </a:r>
             <a:r>
               <a:rPr lang="zh-CN" altLang="en-US" sz="3200"/>
-              <a:t>增加文件操作命令</a:t>
+              <a:t>支持</a:t>
+            </a:r>
+            <a:r>
+              <a:rPr lang="en-US" altLang="zh-CN" sz="3200"/>
+              <a:t>rename</a:t>
+            </a:r>
+            <a:r>
+              <a:rPr lang="zh-CN" altLang="en-US" sz="3200"/>
+              <a:t>操作</a:t>
             </a:r>
             <a:endParaRPr lang="en-US" altLang="zh-CN" sz="3200"/>
           </a:p>
@@ -26045,7 +26053,7 @@
         <p:spPr>
           <a:xfrm>
             <a:off x="623392" y="908720"/>
-            <a:ext cx="11125236" cy="5632311"/>
+            <a:ext cx="11125236" cy="5878532"/>
           </a:xfrm>
           <a:prstGeom prst="rect">
             <a:avLst/>
@@ -26062,19 +26070,66 @@
           <a:p>
             <a:r>
               <a:rPr lang="en-US" altLang="zh-CN"/>
-              <a:t>[shell]: </a:t>
+              <a:t>[ramfs_rename]:</a:t>
+            </a:r>
+            <a:r>
+              <a:rPr lang="zh-CN" altLang="en-US" sz="1800"/>
+              <a:t>支持</a:t>
+            </a:r>
+            <a:r>
+              <a:rPr lang="en-US" altLang="zh-CN" sz="1800"/>
+              <a:t>ramfs</a:t>
+            </a:r>
+            <a:r>
+              <a:rPr lang="zh-CN" altLang="en-US" sz="1800"/>
+              <a:t>的</a:t>
+            </a:r>
+            <a:r>
+              <a:rPr lang="en-US" altLang="zh-CN" sz="1800"/>
+              <a:t>rename</a:t>
+            </a:r>
+            <a:r>
+              <a:rPr lang="zh-CN" altLang="en-US" sz="1800"/>
+              <a:t>操作</a:t>
             </a:r>
             <a:r>
               <a:rPr lang="zh-CN" altLang="en-US"/>
-              <a:t>在交互式</a:t>
+              <a:t>。</a:t>
+            </a:r>
+            <a:endParaRPr lang="en-US" altLang="zh-CN"/>
+          </a:p>
+          <a:p>
+            <a:endParaRPr lang="en-US" altLang="zh-CN"/>
+          </a:p>
+          <a:p>
+            <a:r>
+              <a:rPr lang="zh-CN" altLang="en-US"/>
+              <a:t>预备： </a:t>
+            </a:r>
+            <a:endParaRPr lang="en-US" altLang="zh-CN"/>
+          </a:p>
+          <a:p>
+            <a:r>
+              <a:rPr lang="zh-CN" altLang="en-US"/>
+              <a:t>执行</a:t>
+            </a:r>
+            <a:r>
+              <a:rPr lang="en-US" altLang="zh-CN" b="1"/>
+              <a:t>make run A=exercises/ramfs_rename/ BLK=y</a:t>
+            </a:r>
+          </a:p>
+          <a:p>
+            <a:r>
+              <a:rPr lang="zh-CN" altLang="en-US"/>
+              <a:t>显示</a:t>
             </a:r>
             <a:r>
               <a:rPr lang="en-US" altLang="zh-CN"/>
-              <a:t>shell</a:t>
+              <a:t>ramfs</a:t>
             </a:r>
             <a:r>
               <a:rPr lang="zh-CN" altLang="en-US"/>
-              <a:t>的子命令集中增加对</a:t>
+              <a:t>对</a:t>
             </a:r>
             <a:r>
               <a:rPr lang="en-US" altLang="zh-CN"/>
@@ -26082,15 +26137,7 @@
             </a:r>
             <a:r>
               <a:rPr lang="zh-CN" altLang="en-US"/>
-              <a:t>和</a:t>
-            </a:r>
-            <a:r>
-              <a:rPr lang="en-US" altLang="zh-CN"/>
-              <a:t>mv</a:t>
-            </a:r>
-            <a:r>
-              <a:rPr lang="zh-CN" altLang="en-US"/>
-              <a:t>的支持。</a:t>
+              <a:t>操作不支持，如下图：</a:t>
             </a:r>
             <a:endParaRPr lang="en-US" altLang="zh-CN"/>
           </a:p>
@@ -26098,50 +26145,9 @@
             <a:endParaRPr lang="en-US" altLang="zh-CN"/>
           </a:p>
           <a:p>
-            <a:r>
-              <a:rPr lang="zh-CN" altLang="en-US"/>
-              <a:t>预备： </a:t>
-            </a:r>
             <a:endParaRPr lang="en-US" altLang="zh-CN"/>
           </a:p>
           <a:p>
-            <a:r>
-              <a:rPr lang="zh-CN" altLang="en-US"/>
-              <a:t>执行</a:t>
-            </a:r>
-            <a:r>
-              <a:rPr lang="en-US" altLang="zh-CN" b="1"/>
-              <a:t>make run A=examples/shell/ BLK=y</a:t>
-            </a:r>
-          </a:p>
-          <a:p>
-            <a:r>
-              <a:rPr lang="zh-CN" altLang="en-US"/>
-              <a:t>可以看到一个交换界面，其中有一组可用的文件操作子命令，如右图。</a:t>
-            </a:r>
-            <a:endParaRPr lang="en-US" altLang="zh-CN"/>
-          </a:p>
-          <a:p>
-            <a:r>
-              <a:rPr lang="zh-CN" altLang="en-US"/>
-              <a:t>但是其中不包括</a:t>
-            </a:r>
-            <a:r>
-              <a:rPr lang="en-US" altLang="zh-CN"/>
-              <a:t>rename</a:t>
-            </a:r>
-            <a:r>
-              <a:rPr lang="zh-CN" altLang="en-US"/>
-              <a:t>和</a:t>
-            </a:r>
-            <a:r>
-              <a:rPr lang="en-US" altLang="zh-CN"/>
-              <a:t>mv</a:t>
-            </a:r>
-            <a:r>
-              <a:rPr lang="zh-CN" altLang="en-US"/>
-              <a:t>两个操作。</a:t>
-            </a:r>
             <a:endParaRPr lang="en-US" altLang="zh-CN"/>
           </a:p>
           <a:p>
@@ -26164,31 +26170,23 @@
             </a:r>
             <a:r>
               <a:rPr lang="zh-CN" altLang="en-US"/>
-              <a:t>可以修改</a:t>
+              <a:t>采用</a:t>
             </a:r>
             <a:r>
               <a:rPr lang="en-US" altLang="zh-CN"/>
-              <a:t>examples/shell</a:t>
+              <a:t>patch</a:t>
             </a:r>
             <a:r>
               <a:rPr lang="zh-CN" altLang="en-US"/>
-              <a:t>以及其它任何组件，支持</a:t>
-            </a:r>
-            <a:r>
-              <a:rPr lang="en-US" altLang="zh-CN" b="1"/>
-              <a:t>rename</a:t>
-            </a:r>
-            <a:r>
-              <a:rPr lang="zh-CN" altLang="en-US" b="1"/>
-              <a:t>和</a:t>
-            </a:r>
-            <a:r>
-              <a:rPr lang="en-US" altLang="zh-CN" b="1"/>
-              <a:t>mv</a:t>
+              <a:t>方式让工程临时使用</a:t>
+            </a:r>
+            <a:r>
+              <a:rPr lang="en-US" altLang="zh-CN"/>
+              <a:t>oscamp/arceos/axfs_ramfs</a:t>
             </a:r>
             <a:r>
               <a:rPr lang="zh-CN" altLang="en-US"/>
-              <a:t>两个操作。</a:t>
+              <a:t>的本地组件仓库。</a:t>
             </a:r>
             <a:endParaRPr lang="en-US" altLang="zh-CN"/>
           </a:p>
@@ -26199,15 +26197,27 @@
             </a:r>
             <a:r>
               <a:rPr lang="zh-CN" altLang="en-US"/>
-              <a:t>实现后，能够在</a:t>
+              <a:t>修改本地组件</a:t>
             </a:r>
             <a:r>
               <a:rPr lang="en-US" altLang="zh-CN"/>
-              <a:t>shell</a:t>
+              <a:t>axfs_ramfs</a:t>
             </a:r>
             <a:r>
               <a:rPr lang="zh-CN" altLang="en-US"/>
-              <a:t>中能够进行如下的操作序列：</a:t>
+              <a:t>，</a:t>
+            </a:r>
+            <a:r>
+              <a:rPr lang="zh-CN" altLang="en-US" sz="1800"/>
+              <a:t>增加相关函数，实现部分</a:t>
+            </a:r>
+            <a:r>
+              <a:rPr lang="en-US" altLang="zh-CN" sz="1800"/>
+              <a:t>trait</a:t>
+            </a:r>
+            <a:r>
+              <a:rPr lang="zh-CN" altLang="en-US" sz="1800"/>
+              <a:t>，让测试通过。</a:t>
             </a:r>
             <a:endParaRPr lang="en-US" altLang="zh-CN"/>
           </a:p>
@@ -26215,55 +26225,61 @@
             <a:endParaRPr lang="en-US" altLang="zh-CN"/>
           </a:p>
           <a:p>
+            <a:endParaRPr lang="en-US" altLang="zh-CN"/>
+          </a:p>
+          <a:p>
+            <a:endParaRPr lang="en-US" altLang="zh-CN"/>
+          </a:p>
+          <a:p>
+            <a:endParaRPr lang="en-US" altLang="zh-CN"/>
+          </a:p>
+          <a:p>
+            <a:endParaRPr lang="en-US" altLang="zh-CN"/>
+          </a:p>
+          <a:p>
+            <a:endParaRPr lang="en-US" altLang="zh-CN"/>
+          </a:p>
+          <a:p>
+            <a:r>
+              <a:rPr lang="zh-CN" altLang="en-US"/>
+              <a:t>提示：对第</a:t>
+            </a:r>
             <a:r>
               <a:rPr lang="en-US" altLang="zh-CN"/>
-              <a:t>mkdir dira</a:t>
-            </a:r>
-          </a:p>
-          <a:p>
+              <a:t>1</a:t>
+            </a:r>
+            <a:r>
+              <a:rPr lang="zh-CN" altLang="en-US"/>
+              <a:t>点</a:t>
+            </a:r>
             <a:r>
               <a:rPr lang="en-US" altLang="zh-CN"/>
-              <a:t>rename dira dirb</a:t>
-            </a:r>
-          </a:p>
-          <a:p>
-            <a:r>
-              <a:rPr lang="en-US" altLang="zh-CN"/>
-              <a:t>echo "hello" &gt; a.txt</a:t>
-            </a:r>
-          </a:p>
-          <a:p>
-            <a:r>
-              <a:rPr lang="en-US" altLang="zh-CN"/>
-              <a:t>rename a.txt b.txt</a:t>
-            </a:r>
-          </a:p>
-          <a:p>
-            <a:r>
-              <a:rPr lang="en-US" altLang="zh-CN"/>
-              <a:t>mv b.txt ./dirb</a:t>
-            </a:r>
-          </a:p>
-          <a:p>
-            <a:r>
-              <a:rPr lang="en-US" altLang="zh-CN"/>
-              <a:t>ls ./dirb</a:t>
-            </a:r>
-          </a:p>
-          <a:p>
+              <a:t>patch</a:t>
+            </a:r>
+            <a:r>
+              <a:rPr lang="zh-CN" altLang="en-US"/>
+              <a:t>的方式，参考</a:t>
+            </a:r>
             <a:endParaRPr lang="en-US" altLang="zh-CN"/>
           </a:p>
           <a:p>
-            <a:endParaRPr lang="en-US" altLang="zh-CN"/>
+            <a:r>
+              <a:rPr lang="en-US" altLang="zh-CN" sz="1600">
+                <a:solidFill>
+                  <a:schemeClr val="accent1"/>
+                </a:solidFill>
+              </a:rPr>
+              <a:t>https://rustwiki.org/zh-CN/edition-guide/rust-2018/cargo-and-crates-io/replacing-dependencies-with-patch.html</a:t>
+            </a:r>
           </a:p>
         </p:txBody>
       </p:sp>
       <p:pic>
         <p:nvPicPr>
-          <p:cNvPr id="3" name="图片 2">
-            <a:extLst>
-              <a:ext uri="{FF2B5EF4-FFF2-40B4-BE49-F238E27FC236}">
-                <a16:creationId xmlns:a16="http://schemas.microsoft.com/office/drawing/2014/main" id="{2B5390B0-BD85-5ECE-531E-5A2BA01644CC}"/>
+          <p:cNvPr id="7" name="图片 6">
+            <a:extLst>
+              <a:ext uri="{FF2B5EF4-FFF2-40B4-BE49-F238E27FC236}">
+                <a16:creationId xmlns:a16="http://schemas.microsoft.com/office/drawing/2014/main" id="{611DD1AB-6EE4-92C2-D07E-1D73135FEB78}"/>
               </a:ext>
             </a:extLst>
           </p:cNvPr>
@@ -26280,8 +26296,38 @@
         </p:blipFill>
         <p:spPr>
           <a:xfrm>
-            <a:off x="7927136" y="1088740"/>
-            <a:ext cx="2064273" cy="2135233"/>
+            <a:off x="767408" y="2409970"/>
+            <a:ext cx="8983196" cy="1222565"/>
+          </a:xfrm>
+          <a:prstGeom prst="rect">
+            <a:avLst/>
+          </a:prstGeom>
+        </p:spPr>
+      </p:pic>
+      <p:pic>
+        <p:nvPicPr>
+          <p:cNvPr id="9" name="图片 8">
+            <a:extLst>
+              <a:ext uri="{FF2B5EF4-FFF2-40B4-BE49-F238E27FC236}">
+                <a16:creationId xmlns:a16="http://schemas.microsoft.com/office/drawing/2014/main" id="{E69DED04-F0FE-5C6E-EFA1-BF19C4F176FD}"/>
+              </a:ext>
+            </a:extLst>
+          </p:cNvPr>
+          <p:cNvPicPr>
+            <a:picLocks noChangeAspect="1"/>
+          </p:cNvPicPr>
+          <p:nvPr/>
+        </p:nvPicPr>
+        <p:blipFill>
+          <a:blip r:embed="rId3"/>
+          <a:stretch>
+            <a:fillRect/>
+          </a:stretch>
+        </p:blipFill>
+        <p:spPr>
+          <a:xfrm>
+            <a:off x="751709" y="4604558"/>
+            <a:ext cx="4397715" cy="1222565"/>
           </a:xfrm>
           <a:prstGeom prst="rect">
             <a:avLst/>

</xml_diff>